<commit_message>
grad div english version
</commit_message>
<xml_diff>
--- a/pics/2910-08-25_divergence/pics.pptx
+++ b/pics/2910-08-25_divergence/pics.pptx
@@ -7,7 +7,9 @@
   <p:sldIdLst>
     <p:sldId id="257" r:id="rId2"/>
     <p:sldId id="258" r:id="rId3"/>
-    <p:sldId id="259" r:id="rId4"/>
+    <p:sldId id="260" r:id="rId4"/>
+    <p:sldId id="259" r:id="rId5"/>
+    <p:sldId id="261" r:id="rId6"/>
   </p:sldIdLst>
   <p:sldSz cx="9144000" cy="6858000" type="screen4x3"/>
   <p:notesSz cx="6858000" cy="9144000"/>
@@ -245,7 +247,7 @@
           <a:p>
             <a:fld id="{2A9FF36E-3382-493D-8764-F634F234F60C}" type="datetimeFigureOut">
               <a:rPr lang="ko-KR" altLang="en-US" smtClean="0"/>
-              <a:t>2019-08-25</a:t>
+              <a:t>2023-04-21</a:t>
             </a:fld>
             <a:endParaRPr lang="ko-KR" altLang="en-US"/>
           </a:p>
@@ -415,7 +417,7 @@
           <a:p>
             <a:fld id="{2A9FF36E-3382-493D-8764-F634F234F60C}" type="datetimeFigureOut">
               <a:rPr lang="ko-KR" altLang="en-US" smtClean="0"/>
-              <a:t>2019-08-25</a:t>
+              <a:t>2023-04-21</a:t>
             </a:fld>
             <a:endParaRPr lang="ko-KR" altLang="en-US"/>
           </a:p>
@@ -595,7 +597,7 @@
           <a:p>
             <a:fld id="{2A9FF36E-3382-493D-8764-F634F234F60C}" type="datetimeFigureOut">
               <a:rPr lang="ko-KR" altLang="en-US" smtClean="0"/>
-              <a:t>2019-08-25</a:t>
+              <a:t>2023-04-21</a:t>
             </a:fld>
             <a:endParaRPr lang="ko-KR" altLang="en-US"/>
           </a:p>
@@ -765,7 +767,7 @@
           <a:p>
             <a:fld id="{2A9FF36E-3382-493D-8764-F634F234F60C}" type="datetimeFigureOut">
               <a:rPr lang="ko-KR" altLang="en-US" smtClean="0"/>
-              <a:t>2019-08-25</a:t>
+              <a:t>2023-04-21</a:t>
             </a:fld>
             <a:endParaRPr lang="ko-KR" altLang="en-US"/>
           </a:p>
@@ -1009,7 +1011,7 @@
           <a:p>
             <a:fld id="{2A9FF36E-3382-493D-8764-F634F234F60C}" type="datetimeFigureOut">
               <a:rPr lang="ko-KR" altLang="en-US" smtClean="0"/>
-              <a:t>2019-08-25</a:t>
+              <a:t>2023-04-21</a:t>
             </a:fld>
             <a:endParaRPr lang="ko-KR" altLang="en-US"/>
           </a:p>
@@ -1241,7 +1243,7 @@
           <a:p>
             <a:fld id="{2A9FF36E-3382-493D-8764-F634F234F60C}" type="datetimeFigureOut">
               <a:rPr lang="ko-KR" altLang="en-US" smtClean="0"/>
-              <a:t>2019-08-25</a:t>
+              <a:t>2023-04-21</a:t>
             </a:fld>
             <a:endParaRPr lang="ko-KR" altLang="en-US"/>
           </a:p>
@@ -1608,7 +1610,7 @@
           <a:p>
             <a:fld id="{2A9FF36E-3382-493D-8764-F634F234F60C}" type="datetimeFigureOut">
               <a:rPr lang="ko-KR" altLang="en-US" smtClean="0"/>
-              <a:t>2019-08-25</a:t>
+              <a:t>2023-04-21</a:t>
             </a:fld>
             <a:endParaRPr lang="ko-KR" altLang="en-US"/>
           </a:p>
@@ -1726,7 +1728,7 @@
           <a:p>
             <a:fld id="{2A9FF36E-3382-493D-8764-F634F234F60C}" type="datetimeFigureOut">
               <a:rPr lang="ko-KR" altLang="en-US" smtClean="0"/>
-              <a:t>2019-08-25</a:t>
+              <a:t>2023-04-21</a:t>
             </a:fld>
             <a:endParaRPr lang="ko-KR" altLang="en-US"/>
           </a:p>
@@ -1821,7 +1823,7 @@
           <a:p>
             <a:fld id="{2A9FF36E-3382-493D-8764-F634F234F60C}" type="datetimeFigureOut">
               <a:rPr lang="ko-KR" altLang="en-US" smtClean="0"/>
-              <a:t>2019-08-25</a:t>
+              <a:t>2023-04-21</a:t>
             </a:fld>
             <a:endParaRPr lang="ko-KR" altLang="en-US"/>
           </a:p>
@@ -2098,7 +2100,7 @@
           <a:p>
             <a:fld id="{2A9FF36E-3382-493D-8764-F634F234F60C}" type="datetimeFigureOut">
               <a:rPr lang="ko-KR" altLang="en-US" smtClean="0"/>
-              <a:t>2019-08-25</a:t>
+              <a:t>2023-04-21</a:t>
             </a:fld>
             <a:endParaRPr lang="ko-KR" altLang="en-US"/>
           </a:p>
@@ -2355,7 +2357,7 @@
           <a:p>
             <a:fld id="{2A9FF36E-3382-493D-8764-F634F234F60C}" type="datetimeFigureOut">
               <a:rPr lang="ko-KR" altLang="en-US" smtClean="0"/>
-              <a:t>2019-08-25</a:t>
+              <a:t>2023-04-21</a:t>
             </a:fld>
             <a:endParaRPr lang="ko-KR" altLang="en-US"/>
           </a:p>
@@ -2568,7 +2570,7 @@
           <a:p>
             <a:fld id="{2A9FF36E-3382-493D-8764-F634F234F60C}" type="datetimeFigureOut">
               <a:rPr lang="ko-KR" altLang="en-US" smtClean="0"/>
-              <a:t>2019-08-25</a:t>
+              <a:t>2023-04-21</a:t>
             </a:fld>
             <a:endParaRPr lang="ko-KR" altLang="en-US"/>
           </a:p>
@@ -3455,6 +3457,401 @@
       </p:grpSpPr>
       <p:sp>
         <p:nvSpPr>
+          <p:cNvPr id="4" name="타원 3"/>
+          <p:cNvSpPr/>
+          <p:nvPr/>
+        </p:nvSpPr>
+        <p:spPr>
+          <a:xfrm>
+            <a:off x="3429000" y="2400300"/>
+            <a:ext cx="1476375" cy="1476375"/>
+          </a:xfrm>
+          <a:prstGeom prst="ellipse">
+            <a:avLst/>
+          </a:prstGeom>
+          <a:noFill/>
+          <a:ln w="38100">
+            <a:solidFill>
+              <a:schemeClr val="tx1"/>
+            </a:solidFill>
+          </a:ln>
+        </p:spPr>
+        <p:style>
+          <a:lnRef idx="2">
+            <a:schemeClr val="accent1">
+              <a:shade val="50000"/>
+            </a:schemeClr>
+          </a:lnRef>
+          <a:fillRef idx="1">
+            <a:schemeClr val="accent1"/>
+          </a:fillRef>
+          <a:effectRef idx="0">
+            <a:schemeClr val="accent1"/>
+          </a:effectRef>
+          <a:fontRef idx="minor">
+            <a:schemeClr val="lt1"/>
+          </a:fontRef>
+        </p:style>
+        <p:txBody>
+          <a:bodyPr rtlCol="0" anchor="ctr"/>
+          <a:lstStyle/>
+          <a:p>
+            <a:pPr algn="ctr"/>
+            <a:r>
+              <a:rPr lang="en-US" altLang="ko-KR" dirty="0">
+                <a:solidFill>
+                  <a:sysClr val="windowText" lastClr="000000"/>
+                </a:solidFill>
+              </a:rPr>
+              <a:t>Very Small</a:t>
+            </a:r>
+          </a:p>
+          <a:p>
+            <a:pPr algn="ctr"/>
+            <a:r>
+              <a:rPr lang="en-US" altLang="ko-KR" dirty="0">
+                <a:solidFill>
+                  <a:sysClr val="windowText" lastClr="000000"/>
+                </a:solidFill>
+              </a:rPr>
+              <a:t>Area</a:t>
+            </a:r>
+            <a:endParaRPr lang="ko-KR" altLang="en-US" dirty="0">
+              <a:solidFill>
+                <a:sysClr val="windowText" lastClr="000000"/>
+              </a:solidFill>
+            </a:endParaRPr>
+          </a:p>
+        </p:txBody>
+      </p:sp>
+      <p:cxnSp>
+        <p:nvCxnSpPr>
+          <p:cNvPr id="6" name="직선 화살표 연결선 5"/>
+          <p:cNvCxnSpPr/>
+          <p:nvPr/>
+        </p:nvCxnSpPr>
+        <p:spPr>
+          <a:xfrm>
+            <a:off x="4176712" y="838200"/>
+            <a:ext cx="0" cy="1447800"/>
+          </a:xfrm>
+          <a:prstGeom prst="straightConnector1">
+            <a:avLst/>
+          </a:prstGeom>
+          <a:ln w="28575">
+            <a:solidFill>
+              <a:schemeClr val="tx1"/>
+            </a:solidFill>
+            <a:headEnd type="arrow" w="med" len="med"/>
+            <a:tailEnd type="arrow" w="med" len="med"/>
+          </a:ln>
+        </p:spPr>
+        <p:style>
+          <a:lnRef idx="1">
+            <a:schemeClr val="accent1"/>
+          </a:lnRef>
+          <a:fillRef idx="0">
+            <a:schemeClr val="accent1"/>
+          </a:fillRef>
+          <a:effectRef idx="0">
+            <a:schemeClr val="accent1"/>
+          </a:effectRef>
+          <a:fontRef idx="minor">
+            <a:schemeClr val="tx1"/>
+          </a:fontRef>
+        </p:style>
+      </p:cxnSp>
+      <p:cxnSp>
+        <p:nvCxnSpPr>
+          <p:cNvPr id="8" name="직선 화살표 연결선 7"/>
+          <p:cNvCxnSpPr/>
+          <p:nvPr/>
+        </p:nvCxnSpPr>
+        <p:spPr>
+          <a:xfrm flipH="1">
+            <a:off x="4905375" y="1123950"/>
+            <a:ext cx="1676400" cy="1504950"/>
+          </a:xfrm>
+          <a:prstGeom prst="straightConnector1">
+            <a:avLst/>
+          </a:prstGeom>
+          <a:ln w="28575">
+            <a:solidFill>
+              <a:schemeClr val="tx1"/>
+            </a:solidFill>
+            <a:headEnd type="arrow" w="med" len="med"/>
+            <a:tailEnd type="arrow" w="med" len="med"/>
+          </a:ln>
+        </p:spPr>
+        <p:style>
+          <a:lnRef idx="1">
+            <a:schemeClr val="accent1"/>
+          </a:lnRef>
+          <a:fillRef idx="0">
+            <a:schemeClr val="accent1"/>
+          </a:fillRef>
+          <a:effectRef idx="0">
+            <a:schemeClr val="accent1"/>
+          </a:effectRef>
+          <a:fontRef idx="minor">
+            <a:schemeClr val="tx1"/>
+          </a:fontRef>
+        </p:style>
+      </p:cxnSp>
+      <p:cxnSp>
+        <p:nvCxnSpPr>
+          <p:cNvPr id="10" name="직선 화살표 연결선 9"/>
+          <p:cNvCxnSpPr/>
+          <p:nvPr/>
+        </p:nvCxnSpPr>
+        <p:spPr>
+          <a:xfrm flipH="1">
+            <a:off x="5200650" y="3138487"/>
+            <a:ext cx="2343150" cy="0"/>
+          </a:xfrm>
+          <a:prstGeom prst="straightConnector1">
+            <a:avLst/>
+          </a:prstGeom>
+          <a:ln w="28575">
+            <a:solidFill>
+              <a:schemeClr val="tx1"/>
+            </a:solidFill>
+            <a:headEnd type="arrow" w="med" len="med"/>
+            <a:tailEnd type="arrow" w="med" len="med"/>
+          </a:ln>
+        </p:spPr>
+        <p:style>
+          <a:lnRef idx="1">
+            <a:schemeClr val="accent1"/>
+          </a:lnRef>
+          <a:fillRef idx="0">
+            <a:schemeClr val="accent1"/>
+          </a:fillRef>
+          <a:effectRef idx="0">
+            <a:schemeClr val="accent1"/>
+          </a:effectRef>
+          <a:fontRef idx="minor">
+            <a:schemeClr val="tx1"/>
+          </a:fontRef>
+        </p:style>
+      </p:cxnSp>
+      <p:cxnSp>
+        <p:nvCxnSpPr>
+          <p:cNvPr id="12" name="직선 화살표 연결선 11"/>
+          <p:cNvCxnSpPr/>
+          <p:nvPr/>
+        </p:nvCxnSpPr>
+        <p:spPr>
+          <a:xfrm flipH="1" flipV="1">
+            <a:off x="5035395" y="3765241"/>
+            <a:ext cx="1813080" cy="1711634"/>
+          </a:xfrm>
+          <a:prstGeom prst="straightConnector1">
+            <a:avLst/>
+          </a:prstGeom>
+          <a:ln w="28575">
+            <a:solidFill>
+              <a:schemeClr val="tx1"/>
+            </a:solidFill>
+            <a:headEnd type="arrow" w="med" len="med"/>
+            <a:tailEnd type="arrow" w="med" len="med"/>
+          </a:ln>
+        </p:spPr>
+        <p:style>
+          <a:lnRef idx="1">
+            <a:schemeClr val="accent1"/>
+          </a:lnRef>
+          <a:fillRef idx="0">
+            <a:schemeClr val="accent1"/>
+          </a:fillRef>
+          <a:effectRef idx="0">
+            <a:schemeClr val="accent1"/>
+          </a:effectRef>
+          <a:fontRef idx="minor">
+            <a:schemeClr val="tx1"/>
+          </a:fontRef>
+        </p:style>
+      </p:cxnSp>
+      <p:cxnSp>
+        <p:nvCxnSpPr>
+          <p:cNvPr id="15" name="직선 화살표 연결선 14"/>
+          <p:cNvCxnSpPr/>
+          <p:nvPr/>
+        </p:nvCxnSpPr>
+        <p:spPr>
+          <a:xfrm>
+            <a:off x="2276475" y="1123950"/>
+            <a:ext cx="1152525" cy="1400175"/>
+          </a:xfrm>
+          <a:prstGeom prst="straightConnector1">
+            <a:avLst/>
+          </a:prstGeom>
+          <a:ln w="28575">
+            <a:solidFill>
+              <a:schemeClr val="tx1"/>
+            </a:solidFill>
+            <a:headEnd type="arrow" w="med" len="med"/>
+            <a:tailEnd type="arrow" w="med" len="med"/>
+          </a:ln>
+        </p:spPr>
+        <p:style>
+          <a:lnRef idx="1">
+            <a:schemeClr val="accent1"/>
+          </a:lnRef>
+          <a:fillRef idx="0">
+            <a:schemeClr val="accent1"/>
+          </a:fillRef>
+          <a:effectRef idx="0">
+            <a:schemeClr val="accent1"/>
+          </a:effectRef>
+          <a:fontRef idx="minor">
+            <a:schemeClr val="tx1"/>
+          </a:fontRef>
+        </p:style>
+      </p:cxnSp>
+      <p:cxnSp>
+        <p:nvCxnSpPr>
+          <p:cNvPr id="17" name="직선 화살표 연결선 16"/>
+          <p:cNvCxnSpPr/>
+          <p:nvPr/>
+        </p:nvCxnSpPr>
+        <p:spPr>
+          <a:xfrm>
+            <a:off x="1233487" y="3138487"/>
+            <a:ext cx="1905000" cy="0"/>
+          </a:xfrm>
+          <a:prstGeom prst="straightConnector1">
+            <a:avLst/>
+          </a:prstGeom>
+          <a:ln w="28575">
+            <a:solidFill>
+              <a:schemeClr val="tx1"/>
+            </a:solidFill>
+            <a:headEnd type="arrow" w="med" len="med"/>
+            <a:tailEnd type="arrow" w="med" len="med"/>
+          </a:ln>
+        </p:spPr>
+        <p:style>
+          <a:lnRef idx="1">
+            <a:schemeClr val="accent1"/>
+          </a:lnRef>
+          <a:fillRef idx="0">
+            <a:schemeClr val="accent1"/>
+          </a:fillRef>
+          <a:effectRef idx="0">
+            <a:schemeClr val="accent1"/>
+          </a:effectRef>
+          <a:fontRef idx="minor">
+            <a:schemeClr val="tx1"/>
+          </a:fontRef>
+        </p:style>
+      </p:cxnSp>
+      <p:cxnSp>
+        <p:nvCxnSpPr>
+          <p:cNvPr id="19" name="직선 화살표 연결선 18"/>
+          <p:cNvCxnSpPr/>
+          <p:nvPr/>
+        </p:nvCxnSpPr>
+        <p:spPr>
+          <a:xfrm flipV="1">
+            <a:off x="1752600" y="3765241"/>
+            <a:ext cx="1521134" cy="1454459"/>
+          </a:xfrm>
+          <a:prstGeom prst="straightConnector1">
+            <a:avLst/>
+          </a:prstGeom>
+          <a:ln w="28575">
+            <a:solidFill>
+              <a:schemeClr val="tx1"/>
+            </a:solidFill>
+            <a:headEnd type="arrow" w="med" len="med"/>
+            <a:tailEnd type="arrow" w="med" len="med"/>
+          </a:ln>
+        </p:spPr>
+        <p:style>
+          <a:lnRef idx="1">
+            <a:schemeClr val="accent1"/>
+          </a:lnRef>
+          <a:fillRef idx="0">
+            <a:schemeClr val="accent1"/>
+          </a:fillRef>
+          <a:effectRef idx="0">
+            <a:schemeClr val="accent1"/>
+          </a:effectRef>
+          <a:fontRef idx="minor">
+            <a:schemeClr val="tx1"/>
+          </a:fontRef>
+        </p:style>
+      </p:cxnSp>
+      <p:cxnSp>
+        <p:nvCxnSpPr>
+          <p:cNvPr id="21" name="직선 화살표 연결선 20"/>
+          <p:cNvCxnSpPr/>
+          <p:nvPr/>
+        </p:nvCxnSpPr>
+        <p:spPr>
+          <a:xfrm flipV="1">
+            <a:off x="4195761" y="4095750"/>
+            <a:ext cx="0" cy="1828800"/>
+          </a:xfrm>
+          <a:prstGeom prst="straightConnector1">
+            <a:avLst/>
+          </a:prstGeom>
+          <a:ln w="28575">
+            <a:solidFill>
+              <a:schemeClr val="tx1"/>
+            </a:solidFill>
+            <a:headEnd type="arrow" w="med" len="med"/>
+            <a:tailEnd type="arrow" w="med" len="med"/>
+          </a:ln>
+        </p:spPr>
+        <p:style>
+          <a:lnRef idx="1">
+            <a:schemeClr val="accent1"/>
+          </a:lnRef>
+          <a:fillRef idx="0">
+            <a:schemeClr val="accent1"/>
+          </a:fillRef>
+          <a:effectRef idx="0">
+            <a:schemeClr val="accent1"/>
+          </a:effectRef>
+          <a:fontRef idx="minor">
+            <a:schemeClr val="tx1"/>
+          </a:fontRef>
+        </p:style>
+      </p:cxnSp>
+    </p:spTree>
+    <p:extLst>
+      <p:ext uri="{BB962C8B-B14F-4D97-AF65-F5344CB8AC3E}">
+        <p14:creationId xmlns:p14="http://schemas.microsoft.com/office/powerpoint/2010/main" val="2716699427"/>
+      </p:ext>
+    </p:extLst>
+  </p:cSld>
+  <p:clrMapOvr>
+    <a:masterClrMapping/>
+  </p:clrMapOvr>
+</p:sld>
+</file>
+
+<file path=ppt/slides/slide4.xml><?xml version="1.0" encoding="utf-8"?>
+<p:sld xmlns:a="http://schemas.openxmlformats.org/drawingml/2006/main" xmlns:r="http://schemas.openxmlformats.org/officeDocument/2006/relationships" xmlns:p="http://schemas.openxmlformats.org/presentationml/2006/main">
+  <p:cSld>
+    <p:spTree>
+      <p:nvGrpSpPr>
+        <p:cNvPr id="1" name=""/>
+        <p:cNvGrpSpPr/>
+        <p:nvPr/>
+      </p:nvGrpSpPr>
+      <p:grpSpPr>
+        <a:xfrm>
+          <a:off x="0" y="0"/>
+          <a:ext cx="0" cy="0"/>
+          <a:chOff x="0" y="0"/>
+          <a:chExt cx="0" cy="0"/>
+        </a:xfrm>
+      </p:grpSpPr>
+      <p:sp>
+        <p:nvSpPr>
           <p:cNvPr id="4" name="직사각형 3"/>
           <p:cNvSpPr/>
           <p:nvPr/>
@@ -4638,6 +5035,1212 @@
     <p:extLst>
       <p:ext uri="{BB962C8B-B14F-4D97-AF65-F5344CB8AC3E}">
         <p14:creationId xmlns:p14="http://schemas.microsoft.com/office/powerpoint/2010/main" val="3184516804"/>
+      </p:ext>
+    </p:extLst>
+  </p:cSld>
+  <p:clrMapOvr>
+    <a:masterClrMapping/>
+  </p:clrMapOvr>
+</p:sld>
+</file>
+
+<file path=ppt/slides/slide5.xml><?xml version="1.0" encoding="utf-8"?>
+<p:sld xmlns:a="http://schemas.openxmlformats.org/drawingml/2006/main" xmlns:r="http://schemas.openxmlformats.org/officeDocument/2006/relationships" xmlns:p="http://schemas.openxmlformats.org/presentationml/2006/main">
+  <p:cSld>
+    <p:spTree>
+      <p:nvGrpSpPr>
+        <p:cNvPr id="1" name=""/>
+        <p:cNvGrpSpPr/>
+        <p:nvPr/>
+      </p:nvGrpSpPr>
+      <p:grpSpPr>
+        <a:xfrm>
+          <a:off x="0" y="0"/>
+          <a:ext cx="0" cy="0"/>
+          <a:chOff x="0" y="0"/>
+          <a:chExt cx="0" cy="0"/>
+        </a:xfrm>
+      </p:grpSpPr>
+      <p:sp>
+        <p:nvSpPr>
+          <p:cNvPr id="4" name="직사각형 3"/>
+          <p:cNvSpPr/>
+          <p:nvPr/>
+        </p:nvSpPr>
+        <p:spPr>
+          <a:xfrm>
+            <a:off x="3429000" y="2085975"/>
+            <a:ext cx="1676400" cy="1676400"/>
+          </a:xfrm>
+          <a:prstGeom prst="rect">
+            <a:avLst/>
+          </a:prstGeom>
+          <a:solidFill>
+            <a:schemeClr val="bg1"/>
+          </a:solidFill>
+          <a:ln>
+            <a:solidFill>
+              <a:schemeClr val="tx1"/>
+            </a:solidFill>
+          </a:ln>
+        </p:spPr>
+        <p:style>
+          <a:lnRef idx="2">
+            <a:schemeClr val="accent1">
+              <a:shade val="50000"/>
+            </a:schemeClr>
+          </a:lnRef>
+          <a:fillRef idx="1">
+            <a:schemeClr val="accent1"/>
+          </a:fillRef>
+          <a:effectRef idx="0">
+            <a:schemeClr val="accent1"/>
+          </a:effectRef>
+          <a:fontRef idx="minor">
+            <a:schemeClr val="lt1"/>
+          </a:fontRef>
+        </p:style>
+        <p:txBody>
+          <a:bodyPr rtlCol="0" anchor="ctr"/>
+          <a:lstStyle/>
+          <a:p>
+            <a:pPr algn="ctr"/>
+            <a:endParaRPr lang="ko-KR" altLang="en-US" dirty="0">
+              <a:solidFill>
+                <a:sysClr val="windowText" lastClr="000000"/>
+              </a:solidFill>
+            </a:endParaRPr>
+          </a:p>
+        </p:txBody>
+      </p:sp>
+      <p:cxnSp>
+        <p:nvCxnSpPr>
+          <p:cNvPr id="6" name="직선 화살표 연결선 5"/>
+          <p:cNvCxnSpPr/>
+          <p:nvPr/>
+        </p:nvCxnSpPr>
+        <p:spPr>
+          <a:xfrm>
+            <a:off x="5105400" y="2886075"/>
+            <a:ext cx="1943100" cy="0"/>
+          </a:xfrm>
+          <a:prstGeom prst="straightConnector1">
+            <a:avLst/>
+          </a:prstGeom>
+          <a:ln w="57150">
+            <a:solidFill>
+              <a:schemeClr val="tx1"/>
+            </a:solidFill>
+            <a:tailEnd type="triangle"/>
+          </a:ln>
+        </p:spPr>
+        <p:style>
+          <a:lnRef idx="1">
+            <a:schemeClr val="accent1"/>
+          </a:lnRef>
+          <a:fillRef idx="0">
+            <a:schemeClr val="accent1"/>
+          </a:fillRef>
+          <a:effectRef idx="0">
+            <a:schemeClr val="accent1"/>
+          </a:effectRef>
+          <a:fontRef idx="minor">
+            <a:schemeClr val="tx1"/>
+          </a:fontRef>
+        </p:style>
+      </p:cxnSp>
+      <p:cxnSp>
+        <p:nvCxnSpPr>
+          <p:cNvPr id="7" name="직선 화살표 연결선 6"/>
+          <p:cNvCxnSpPr/>
+          <p:nvPr/>
+        </p:nvCxnSpPr>
+        <p:spPr>
+          <a:xfrm>
+            <a:off x="2066925" y="2886075"/>
+            <a:ext cx="1362075" cy="0"/>
+          </a:xfrm>
+          <a:prstGeom prst="straightConnector1">
+            <a:avLst/>
+          </a:prstGeom>
+          <a:ln w="57150">
+            <a:solidFill>
+              <a:schemeClr val="tx1"/>
+            </a:solidFill>
+            <a:tailEnd type="triangle"/>
+          </a:ln>
+        </p:spPr>
+        <p:style>
+          <a:lnRef idx="1">
+            <a:schemeClr val="accent1"/>
+          </a:lnRef>
+          <a:fillRef idx="0">
+            <a:schemeClr val="accent1"/>
+          </a:fillRef>
+          <a:effectRef idx="0">
+            <a:schemeClr val="accent1"/>
+          </a:effectRef>
+          <a:fontRef idx="minor">
+            <a:schemeClr val="tx1"/>
+          </a:fontRef>
+        </p:style>
+      </p:cxnSp>
+      <mc:AlternateContent xmlns:mc="http://schemas.openxmlformats.org/markup-compatibility/2006">
+        <mc:Choice xmlns:a14="http://schemas.microsoft.com/office/drawing/2010/main" Requires="a14">
+          <p:sp>
+            <p:nvSpPr>
+              <p:cNvPr id="9" name="TextBox 8"/>
+              <p:cNvSpPr txBox="1"/>
+              <p:nvPr/>
+            </p:nvSpPr>
+            <p:spPr>
+              <a:xfrm>
+                <a:off x="122656" y="2445850"/>
+                <a:ext cx="3272242" cy="369332"/>
+              </a:xfrm>
+              <a:prstGeom prst="rect">
+                <a:avLst/>
+              </a:prstGeom>
+              <a:noFill/>
+            </p:spPr>
+            <p:txBody>
+              <a:bodyPr wrap="none" rtlCol="0">
+                <a:spAutoFit/>
+              </a:bodyPr>
+              <a:lstStyle/>
+              <a:p>
+                <a:r>
+                  <a:rPr lang="en-US" altLang="ko-KR" b="0" dirty="0"/>
+                  <a:t>inflow of </a:t>
+                </a:r>
+                <a14:m>
+                  <m:oMath xmlns:m="http://schemas.openxmlformats.org/officeDocument/2006/math">
+                    <m:r>
+                      <a:rPr lang="en-US" altLang="ko-KR" b="0" i="1" dirty="0" smtClean="0">
+                        <a:latin typeface="Cambria Math" panose="02040503050406030204" pitchFamily="18" charset="0"/>
+                      </a:rPr>
+                      <m:t>𝑥</m:t>
+                    </m:r>
+                  </m:oMath>
+                </a14:m>
+                <a:r>
+                  <a:rPr lang="en-US" altLang="ko-KR" b="0" dirty="0"/>
+                  <a:t> component of </a:t>
+                </a:r>
+                <a14:m>
+                  <m:oMath xmlns:m="http://schemas.openxmlformats.org/officeDocument/2006/math">
+                    <m:r>
+                      <a:rPr lang="en-US" altLang="ko-KR" b="0" i="1" smtClean="0">
+                        <a:latin typeface="Cambria Math" panose="02040503050406030204" pitchFamily="18" charset="0"/>
+                      </a:rPr>
+                      <m:t>𝑓</m:t>
+                    </m:r>
+                    <m:r>
+                      <a:rPr lang="en-US" altLang="ko-KR" b="0" i="1" smtClean="0">
+                        <a:latin typeface="Cambria Math" panose="02040503050406030204" pitchFamily="18" charset="0"/>
+                      </a:rPr>
+                      <m:t>(</m:t>
+                    </m:r>
+                    <m:r>
+                      <a:rPr lang="en-US" altLang="ko-KR" b="0" i="1" smtClean="0">
+                        <a:latin typeface="Cambria Math" panose="02040503050406030204" pitchFamily="18" charset="0"/>
+                      </a:rPr>
+                      <m:t>𝑥</m:t>
+                    </m:r>
+                    <m:r>
+                      <a:rPr lang="en-US" altLang="ko-KR" b="0" i="1" smtClean="0">
+                        <a:latin typeface="Cambria Math" panose="02040503050406030204" pitchFamily="18" charset="0"/>
+                      </a:rPr>
+                      <m:t>,</m:t>
+                    </m:r>
+                    <m:r>
+                      <a:rPr lang="en-US" altLang="ko-KR" b="0" i="1" smtClean="0">
+                        <a:latin typeface="Cambria Math" panose="02040503050406030204" pitchFamily="18" charset="0"/>
+                      </a:rPr>
+                      <m:t>𝑦</m:t>
+                    </m:r>
+                    <m:r>
+                      <a:rPr lang="en-US" altLang="ko-KR" b="0" i="1" smtClean="0">
+                        <a:latin typeface="Cambria Math" panose="02040503050406030204" pitchFamily="18" charset="0"/>
+                      </a:rPr>
+                      <m:t>)</m:t>
+                    </m:r>
+                  </m:oMath>
+                </a14:m>
+                <a:endParaRPr lang="ko-KR" altLang="en-US" dirty="0"/>
+              </a:p>
+            </p:txBody>
+          </p:sp>
+        </mc:Choice>
+        <mc:Fallback>
+          <p:sp>
+            <p:nvSpPr>
+              <p:cNvPr id="9" name="TextBox 8"/>
+              <p:cNvSpPr txBox="1">
+                <a:spLocks noRot="1" noChangeAspect="1" noMove="1" noResize="1" noEditPoints="1" noAdjustHandles="1" noChangeArrowheads="1" noChangeShapeType="1" noTextEdit="1"/>
+              </p:cNvSpPr>
+              <p:nvPr/>
+            </p:nvSpPr>
+            <p:spPr>
+              <a:xfrm>
+                <a:off x="122656" y="2445850"/>
+                <a:ext cx="3272242" cy="369332"/>
+              </a:xfrm>
+              <a:prstGeom prst="rect">
+                <a:avLst/>
+              </a:prstGeom>
+              <a:blipFill>
+                <a:blip r:embed="rId2"/>
+                <a:stretch>
+                  <a:fillRect l="-1490" t="-8197" r="-559" b="-24590"/>
+                </a:stretch>
+              </a:blipFill>
+            </p:spPr>
+            <p:txBody>
+              <a:bodyPr/>
+              <a:lstStyle/>
+              <a:p>
+                <a:r>
+                  <a:rPr lang="en-US">
+                    <a:noFill/>
+                  </a:rPr>
+                  <a:t> </a:t>
+                </a:r>
+              </a:p>
+            </p:txBody>
+          </p:sp>
+        </mc:Fallback>
+      </mc:AlternateContent>
+      <mc:AlternateContent xmlns:mc="http://schemas.openxmlformats.org/markup-compatibility/2006">
+        <mc:Choice xmlns:a14="http://schemas.microsoft.com/office/drawing/2010/main" Requires="a14">
+          <p:sp>
+            <p:nvSpPr>
+              <p:cNvPr id="10" name="TextBox 9"/>
+              <p:cNvSpPr txBox="1"/>
+              <p:nvPr/>
+            </p:nvSpPr>
+            <p:spPr>
+              <a:xfrm>
+                <a:off x="5105400" y="2511549"/>
+                <a:ext cx="3963457" cy="369332"/>
+              </a:xfrm>
+              <a:prstGeom prst="rect">
+                <a:avLst/>
+              </a:prstGeom>
+              <a:noFill/>
+            </p:spPr>
+            <p:txBody>
+              <a:bodyPr wrap="none" rtlCol="0">
+                <a:spAutoFit/>
+              </a:bodyPr>
+              <a:lstStyle/>
+              <a:p>
+                <a:r>
+                  <a:rPr lang="en-US" altLang="ko-KR" b="0" dirty="0"/>
+                  <a:t>outflow of x component of </a:t>
+                </a:r>
+                <a14:m>
+                  <m:oMath xmlns:m="http://schemas.openxmlformats.org/officeDocument/2006/math">
+                    <m:r>
+                      <a:rPr lang="en-US" altLang="ko-KR" b="0" i="1" smtClean="0">
+                        <a:latin typeface="Cambria Math" panose="02040503050406030204" pitchFamily="18" charset="0"/>
+                      </a:rPr>
+                      <m:t>𝑓</m:t>
+                    </m:r>
+                    <m:r>
+                      <a:rPr lang="en-US" altLang="ko-KR" b="0" i="1" smtClean="0">
+                        <a:latin typeface="Cambria Math" panose="02040503050406030204" pitchFamily="18" charset="0"/>
+                      </a:rPr>
+                      <m:t>(</m:t>
+                    </m:r>
+                    <m:r>
+                      <a:rPr lang="en-US" altLang="ko-KR" b="0" i="1" smtClean="0">
+                        <a:latin typeface="Cambria Math" panose="02040503050406030204" pitchFamily="18" charset="0"/>
+                      </a:rPr>
+                      <m:t>𝑥</m:t>
+                    </m:r>
+                    <m:r>
+                      <a:rPr lang="en-US" altLang="ko-KR" b="0" i="1" smtClean="0">
+                        <a:latin typeface="Cambria Math" panose="02040503050406030204" pitchFamily="18" charset="0"/>
+                      </a:rPr>
+                      <m:t>+</m:t>
+                    </m:r>
+                    <m:r>
+                      <m:rPr>
+                        <m:sty m:val="p"/>
+                      </m:rPr>
+                      <a:rPr lang="en-US" altLang="ko-KR" b="0" i="0" smtClean="0">
+                        <a:latin typeface="Cambria Math" panose="02040503050406030204" pitchFamily="18" charset="0"/>
+                      </a:rPr>
+                      <m:t>Δ</m:t>
+                    </m:r>
+                    <m:r>
+                      <a:rPr lang="en-US" altLang="ko-KR" b="0" i="1" smtClean="0">
+                        <a:latin typeface="Cambria Math" panose="02040503050406030204" pitchFamily="18" charset="0"/>
+                      </a:rPr>
+                      <m:t>𝑥</m:t>
+                    </m:r>
+                    <m:r>
+                      <a:rPr lang="en-US" altLang="ko-KR" b="0" i="1" smtClean="0">
+                        <a:latin typeface="Cambria Math" panose="02040503050406030204" pitchFamily="18" charset="0"/>
+                      </a:rPr>
+                      <m:t>,</m:t>
+                    </m:r>
+                    <m:r>
+                      <a:rPr lang="en-US" altLang="ko-KR" b="0" i="1" smtClean="0">
+                        <a:latin typeface="Cambria Math" panose="02040503050406030204" pitchFamily="18" charset="0"/>
+                      </a:rPr>
+                      <m:t>𝑦</m:t>
+                    </m:r>
+                    <m:r>
+                      <a:rPr lang="en-US" altLang="ko-KR" b="0" i="1" smtClean="0">
+                        <a:latin typeface="Cambria Math" panose="02040503050406030204" pitchFamily="18" charset="0"/>
+                      </a:rPr>
+                      <m:t>)</m:t>
+                    </m:r>
+                  </m:oMath>
+                </a14:m>
+                <a:endParaRPr lang="ko-KR" altLang="en-US" dirty="0"/>
+              </a:p>
+            </p:txBody>
+          </p:sp>
+        </mc:Choice>
+        <mc:Fallback>
+          <p:sp>
+            <p:nvSpPr>
+              <p:cNvPr id="10" name="TextBox 9"/>
+              <p:cNvSpPr txBox="1">
+                <a:spLocks noRot="1" noChangeAspect="1" noMove="1" noResize="1" noEditPoints="1" noAdjustHandles="1" noChangeArrowheads="1" noChangeShapeType="1" noTextEdit="1"/>
+              </p:cNvSpPr>
+              <p:nvPr/>
+            </p:nvSpPr>
+            <p:spPr>
+              <a:xfrm>
+                <a:off x="5105400" y="2511549"/>
+                <a:ext cx="3963457" cy="369332"/>
+              </a:xfrm>
+              <a:prstGeom prst="rect">
+                <a:avLst/>
+              </a:prstGeom>
+              <a:blipFill>
+                <a:blip r:embed="rId3"/>
+                <a:stretch>
+                  <a:fillRect l="-1385" t="-8197" b="-24590"/>
+                </a:stretch>
+              </a:blipFill>
+            </p:spPr>
+            <p:txBody>
+              <a:bodyPr/>
+              <a:lstStyle/>
+              <a:p>
+                <a:r>
+                  <a:rPr lang="en-US">
+                    <a:noFill/>
+                  </a:rPr>
+                  <a:t> </a:t>
+                </a:r>
+              </a:p>
+            </p:txBody>
+          </p:sp>
+        </mc:Fallback>
+      </mc:AlternateContent>
+      <p:cxnSp>
+        <p:nvCxnSpPr>
+          <p:cNvPr id="12" name="직선 화살표 연결선 11"/>
+          <p:cNvCxnSpPr/>
+          <p:nvPr/>
+        </p:nvCxnSpPr>
+        <p:spPr>
+          <a:xfrm flipV="1">
+            <a:off x="4305244" y="3762375"/>
+            <a:ext cx="0" cy="755619"/>
+          </a:xfrm>
+          <a:prstGeom prst="straightConnector1">
+            <a:avLst/>
+          </a:prstGeom>
+          <a:ln w="57150">
+            <a:solidFill>
+              <a:schemeClr val="tx1"/>
+            </a:solidFill>
+            <a:tailEnd type="triangle"/>
+          </a:ln>
+        </p:spPr>
+        <p:style>
+          <a:lnRef idx="1">
+            <a:schemeClr val="accent1"/>
+          </a:lnRef>
+          <a:fillRef idx="0">
+            <a:schemeClr val="accent1"/>
+          </a:fillRef>
+          <a:effectRef idx="0">
+            <a:schemeClr val="accent1"/>
+          </a:effectRef>
+          <a:fontRef idx="minor">
+            <a:schemeClr val="tx1"/>
+          </a:fontRef>
+        </p:style>
+      </p:cxnSp>
+      <mc:AlternateContent xmlns:mc="http://schemas.openxmlformats.org/markup-compatibility/2006">
+        <mc:Choice xmlns:a14="http://schemas.microsoft.com/office/drawing/2010/main" Requires="a14">
+          <p:sp>
+            <p:nvSpPr>
+              <p:cNvPr id="13" name="TextBox 12"/>
+              <p:cNvSpPr txBox="1"/>
+              <p:nvPr/>
+            </p:nvSpPr>
+            <p:spPr>
+              <a:xfrm>
+                <a:off x="4343372" y="1336923"/>
+                <a:ext cx="3971665" cy="369332"/>
+              </a:xfrm>
+              <a:prstGeom prst="rect">
+                <a:avLst/>
+              </a:prstGeom>
+              <a:noFill/>
+            </p:spPr>
+            <p:txBody>
+              <a:bodyPr wrap="none" rtlCol="0">
+                <a:spAutoFit/>
+              </a:bodyPr>
+              <a:lstStyle/>
+              <a:p>
+                <a:r>
+                  <a:rPr lang="en-US" altLang="ko-KR" dirty="0"/>
+                  <a:t>outflow of </a:t>
+                </a:r>
+                <a14:m>
+                  <m:oMath xmlns:m="http://schemas.openxmlformats.org/officeDocument/2006/math">
+                    <m:r>
+                      <a:rPr lang="en-US" altLang="ko-KR" i="1" dirty="0" smtClean="0">
+                        <a:latin typeface="Cambria Math" panose="02040503050406030204" pitchFamily="18" charset="0"/>
+                      </a:rPr>
+                      <m:t>𝑦</m:t>
+                    </m:r>
+                  </m:oMath>
+                </a14:m>
+                <a:r>
+                  <a:rPr lang="en-US" altLang="ko-KR" dirty="0"/>
+                  <a:t> component of </a:t>
+                </a:r>
+                <a14:m>
+                  <m:oMath xmlns:m="http://schemas.openxmlformats.org/officeDocument/2006/math">
+                    <m:r>
+                      <a:rPr lang="en-US" altLang="ko-KR" b="0" i="1" smtClean="0">
+                        <a:latin typeface="Cambria Math" panose="02040503050406030204" pitchFamily="18" charset="0"/>
+                      </a:rPr>
+                      <m:t>𝑓</m:t>
+                    </m:r>
+                    <m:r>
+                      <a:rPr lang="en-US" altLang="ko-KR" b="0" i="1" smtClean="0">
+                        <a:latin typeface="Cambria Math" panose="02040503050406030204" pitchFamily="18" charset="0"/>
+                      </a:rPr>
+                      <m:t>(</m:t>
+                    </m:r>
+                    <m:r>
+                      <a:rPr lang="en-US" altLang="ko-KR" b="0" i="1" smtClean="0">
+                        <a:latin typeface="Cambria Math" panose="02040503050406030204" pitchFamily="18" charset="0"/>
+                      </a:rPr>
+                      <m:t>𝑥</m:t>
+                    </m:r>
+                    <m:r>
+                      <a:rPr lang="en-US" altLang="ko-KR" b="0" i="1" smtClean="0">
+                        <a:latin typeface="Cambria Math" panose="02040503050406030204" pitchFamily="18" charset="0"/>
+                      </a:rPr>
+                      <m:t>,</m:t>
+                    </m:r>
+                    <m:r>
+                      <a:rPr lang="en-US" altLang="ko-KR" b="0" i="1" smtClean="0">
+                        <a:latin typeface="Cambria Math" panose="02040503050406030204" pitchFamily="18" charset="0"/>
+                      </a:rPr>
+                      <m:t>𝑦</m:t>
+                    </m:r>
+                    <m:r>
+                      <a:rPr lang="en-US" altLang="ko-KR" b="0" i="1" smtClean="0">
+                        <a:latin typeface="Cambria Math" panose="02040503050406030204" pitchFamily="18" charset="0"/>
+                      </a:rPr>
+                      <m:t>+</m:t>
+                    </m:r>
+                    <m:r>
+                      <m:rPr>
+                        <m:sty m:val="p"/>
+                      </m:rPr>
+                      <a:rPr lang="en-US" altLang="ko-KR" b="0" i="0" smtClean="0">
+                        <a:latin typeface="Cambria Math" panose="02040503050406030204" pitchFamily="18" charset="0"/>
+                      </a:rPr>
+                      <m:t>Δ</m:t>
+                    </m:r>
+                    <m:r>
+                      <a:rPr lang="en-US" altLang="ko-KR" b="0" i="1" smtClean="0">
+                        <a:latin typeface="Cambria Math" panose="02040503050406030204" pitchFamily="18" charset="0"/>
+                      </a:rPr>
+                      <m:t>𝑦</m:t>
+                    </m:r>
+                    <m:r>
+                      <a:rPr lang="en-US" altLang="ko-KR" b="0" i="1" smtClean="0">
+                        <a:latin typeface="Cambria Math" panose="02040503050406030204" pitchFamily="18" charset="0"/>
+                      </a:rPr>
+                      <m:t>)</m:t>
+                    </m:r>
+                  </m:oMath>
+                </a14:m>
+                <a:endParaRPr lang="ko-KR" altLang="en-US" dirty="0"/>
+              </a:p>
+            </p:txBody>
+          </p:sp>
+        </mc:Choice>
+        <mc:Fallback>
+          <p:sp>
+            <p:nvSpPr>
+              <p:cNvPr id="13" name="TextBox 12"/>
+              <p:cNvSpPr txBox="1">
+                <a:spLocks noRot="1" noChangeAspect="1" noMove="1" noResize="1" noEditPoints="1" noAdjustHandles="1" noChangeArrowheads="1" noChangeShapeType="1" noTextEdit="1"/>
+              </p:cNvSpPr>
+              <p:nvPr/>
+            </p:nvSpPr>
+            <p:spPr>
+              <a:xfrm>
+                <a:off x="4343372" y="1336923"/>
+                <a:ext cx="3971665" cy="369332"/>
+              </a:xfrm>
+              <a:prstGeom prst="rect">
+                <a:avLst/>
+              </a:prstGeom>
+              <a:blipFill>
+                <a:blip r:embed="rId4"/>
+                <a:stretch>
+                  <a:fillRect l="-1227" t="-8197" r="-153" b="-24590"/>
+                </a:stretch>
+              </a:blipFill>
+            </p:spPr>
+            <p:txBody>
+              <a:bodyPr/>
+              <a:lstStyle/>
+              <a:p>
+                <a:r>
+                  <a:rPr lang="en-US">
+                    <a:noFill/>
+                  </a:rPr>
+                  <a:t> </a:t>
+                </a:r>
+              </a:p>
+            </p:txBody>
+          </p:sp>
+        </mc:Fallback>
+      </mc:AlternateContent>
+      <mc:AlternateContent xmlns:mc="http://schemas.openxmlformats.org/markup-compatibility/2006">
+        <mc:Choice xmlns:a14="http://schemas.microsoft.com/office/drawing/2010/main" Requires="a14">
+          <p:sp>
+            <p:nvSpPr>
+              <p:cNvPr id="16" name="TextBox 15"/>
+              <p:cNvSpPr txBox="1"/>
+              <p:nvPr/>
+            </p:nvSpPr>
+            <p:spPr>
+              <a:xfrm>
+                <a:off x="4314797" y="4054598"/>
+                <a:ext cx="3277051" cy="369332"/>
+              </a:xfrm>
+              <a:prstGeom prst="rect">
+                <a:avLst/>
+              </a:prstGeom>
+              <a:noFill/>
+            </p:spPr>
+            <p:txBody>
+              <a:bodyPr wrap="none" rtlCol="0">
+                <a:spAutoFit/>
+              </a:bodyPr>
+              <a:lstStyle/>
+              <a:p>
+                <a:r>
+                  <a:rPr lang="en-US" altLang="ko-KR" b="0" dirty="0"/>
+                  <a:t>inflow of </a:t>
+                </a:r>
+                <a14:m>
+                  <m:oMath xmlns:m="http://schemas.openxmlformats.org/officeDocument/2006/math">
+                    <m:r>
+                      <a:rPr lang="en-US" altLang="ko-KR" b="0" i="1" dirty="0" smtClean="0">
+                        <a:latin typeface="Cambria Math" panose="02040503050406030204" pitchFamily="18" charset="0"/>
+                      </a:rPr>
+                      <m:t>𝑦</m:t>
+                    </m:r>
+                  </m:oMath>
+                </a14:m>
+                <a:r>
+                  <a:rPr lang="en-US" altLang="ko-KR" b="0" dirty="0"/>
+                  <a:t> component of </a:t>
+                </a:r>
+                <a14:m>
+                  <m:oMath xmlns:m="http://schemas.openxmlformats.org/officeDocument/2006/math">
+                    <m:r>
+                      <a:rPr lang="en-US" altLang="ko-KR" b="0" i="1" smtClean="0">
+                        <a:latin typeface="Cambria Math" panose="02040503050406030204" pitchFamily="18" charset="0"/>
+                      </a:rPr>
+                      <m:t>𝑓</m:t>
+                    </m:r>
+                    <m:r>
+                      <a:rPr lang="en-US" altLang="ko-KR" b="0" i="1" smtClean="0">
+                        <a:latin typeface="Cambria Math" panose="02040503050406030204" pitchFamily="18" charset="0"/>
+                      </a:rPr>
+                      <m:t>(</m:t>
+                    </m:r>
+                    <m:r>
+                      <a:rPr lang="en-US" altLang="ko-KR" b="0" i="1" smtClean="0">
+                        <a:latin typeface="Cambria Math" panose="02040503050406030204" pitchFamily="18" charset="0"/>
+                      </a:rPr>
+                      <m:t>𝑥</m:t>
+                    </m:r>
+                    <m:r>
+                      <a:rPr lang="en-US" altLang="ko-KR" b="0" i="1" smtClean="0">
+                        <a:latin typeface="Cambria Math" panose="02040503050406030204" pitchFamily="18" charset="0"/>
+                      </a:rPr>
+                      <m:t>,</m:t>
+                    </m:r>
+                    <m:r>
+                      <a:rPr lang="en-US" altLang="ko-KR" b="0" i="1" smtClean="0">
+                        <a:latin typeface="Cambria Math" panose="02040503050406030204" pitchFamily="18" charset="0"/>
+                      </a:rPr>
+                      <m:t>𝑦</m:t>
+                    </m:r>
+                    <m:r>
+                      <a:rPr lang="en-US" altLang="ko-KR" b="0" i="1" smtClean="0">
+                        <a:latin typeface="Cambria Math" panose="02040503050406030204" pitchFamily="18" charset="0"/>
+                      </a:rPr>
+                      <m:t>)</m:t>
+                    </m:r>
+                  </m:oMath>
+                </a14:m>
+                <a:endParaRPr lang="ko-KR" altLang="en-US" dirty="0"/>
+              </a:p>
+            </p:txBody>
+          </p:sp>
+        </mc:Choice>
+        <mc:Fallback>
+          <p:sp>
+            <p:nvSpPr>
+              <p:cNvPr id="16" name="TextBox 15"/>
+              <p:cNvSpPr txBox="1">
+                <a:spLocks noRot="1" noChangeAspect="1" noMove="1" noResize="1" noEditPoints="1" noAdjustHandles="1" noChangeArrowheads="1" noChangeShapeType="1" noTextEdit="1"/>
+              </p:cNvSpPr>
+              <p:nvPr/>
+            </p:nvSpPr>
+            <p:spPr>
+              <a:xfrm>
+                <a:off x="4314797" y="4054598"/>
+                <a:ext cx="3277051" cy="369332"/>
+              </a:xfrm>
+              <a:prstGeom prst="rect">
+                <a:avLst/>
+              </a:prstGeom>
+              <a:blipFill>
+                <a:blip r:embed="rId5"/>
+                <a:stretch>
+                  <a:fillRect l="-1676" t="-8197" r="-931" b="-24590"/>
+                </a:stretch>
+              </a:blipFill>
+            </p:spPr>
+            <p:txBody>
+              <a:bodyPr/>
+              <a:lstStyle/>
+              <a:p>
+                <a:r>
+                  <a:rPr lang="en-US">
+                    <a:noFill/>
+                  </a:rPr>
+                  <a:t> </a:t>
+                </a:r>
+              </a:p>
+            </p:txBody>
+          </p:sp>
+        </mc:Fallback>
+      </mc:AlternateContent>
+      <p:sp>
+        <p:nvSpPr>
+          <p:cNvPr id="18" name="원호 17"/>
+          <p:cNvSpPr/>
+          <p:nvPr/>
+        </p:nvSpPr>
+        <p:spPr>
+          <a:xfrm>
+            <a:off x="3028949" y="3441761"/>
+            <a:ext cx="2514600" cy="2514600"/>
+          </a:xfrm>
+          <a:prstGeom prst="arc">
+            <a:avLst>
+              <a:gd name="adj1" fmla="val 13743802"/>
+              <a:gd name="adj2" fmla="val 18743846"/>
+            </a:avLst>
+          </a:prstGeom>
+          <a:ln w="19050">
+            <a:solidFill>
+              <a:schemeClr val="tx1"/>
+            </a:solidFill>
+            <a:prstDash val="sysDot"/>
+          </a:ln>
+        </p:spPr>
+        <p:style>
+          <a:lnRef idx="1">
+            <a:schemeClr val="accent1"/>
+          </a:lnRef>
+          <a:fillRef idx="0">
+            <a:schemeClr val="accent1"/>
+          </a:fillRef>
+          <a:effectRef idx="0">
+            <a:schemeClr val="accent1"/>
+          </a:effectRef>
+          <a:fontRef idx="minor">
+            <a:schemeClr val="tx1"/>
+          </a:fontRef>
+        </p:style>
+        <p:txBody>
+          <a:bodyPr rtlCol="0" anchor="ctr"/>
+          <a:lstStyle/>
+          <a:p>
+            <a:pPr algn="ctr"/>
+            <a:endParaRPr lang="ko-KR" altLang="en-US"/>
+          </a:p>
+        </p:txBody>
+      </p:sp>
+      <mc:AlternateContent xmlns:mc="http://schemas.openxmlformats.org/markup-compatibility/2006">
+        <mc:Choice xmlns:a14="http://schemas.microsoft.com/office/drawing/2010/main" Requires="a14">
+          <p:sp>
+            <p:nvSpPr>
+              <p:cNvPr id="17" name="TextBox 16"/>
+              <p:cNvSpPr txBox="1"/>
+              <p:nvPr/>
+            </p:nvSpPr>
+            <p:spPr>
+              <a:xfrm>
+                <a:off x="3807131" y="3232736"/>
+                <a:ext cx="505844" cy="369332"/>
+              </a:xfrm>
+              <a:prstGeom prst="rect">
+                <a:avLst/>
+              </a:prstGeom>
+              <a:solidFill>
+                <a:schemeClr val="bg1"/>
+              </a:solidFill>
+            </p:spPr>
+            <p:txBody>
+              <a:bodyPr wrap="none" rtlCol="0">
+                <a:spAutoFit/>
+              </a:bodyPr>
+              <a:lstStyle/>
+              <a:p>
+                <a:pPr/>
+                <a14:m>
+                  <m:oMathPara xmlns:m="http://schemas.openxmlformats.org/officeDocument/2006/math">
+                    <m:oMathParaPr>
+                      <m:jc m:val="centerGroup"/>
+                    </m:oMathParaPr>
+                    <m:oMath xmlns:m="http://schemas.openxmlformats.org/officeDocument/2006/math">
+                      <m:r>
+                        <m:rPr>
+                          <m:sty m:val="p"/>
+                        </m:rPr>
+                        <a:rPr lang="en-US" altLang="ko-KR" b="0" i="0" smtClean="0">
+                          <a:latin typeface="Cambria Math" panose="02040503050406030204" pitchFamily="18" charset="0"/>
+                        </a:rPr>
+                        <m:t>Δ</m:t>
+                      </m:r>
+                      <m:r>
+                        <a:rPr lang="en-US" altLang="ko-KR" b="0" i="1" smtClean="0">
+                          <a:latin typeface="Cambria Math" panose="02040503050406030204" pitchFamily="18" charset="0"/>
+                        </a:rPr>
+                        <m:t>𝑥</m:t>
+                      </m:r>
+                    </m:oMath>
+                  </m:oMathPara>
+                </a14:m>
+                <a:endParaRPr lang="ko-KR" altLang="en-US" dirty="0"/>
+              </a:p>
+            </p:txBody>
+          </p:sp>
+        </mc:Choice>
+        <mc:Fallback>
+          <p:sp>
+            <p:nvSpPr>
+              <p:cNvPr id="17" name="TextBox 16"/>
+              <p:cNvSpPr txBox="1">
+                <a:spLocks noRot="1" noChangeAspect="1" noMove="1" noResize="1" noEditPoints="1" noAdjustHandles="1" noChangeArrowheads="1" noChangeShapeType="1" noTextEdit="1"/>
+              </p:cNvSpPr>
+              <p:nvPr/>
+            </p:nvSpPr>
+            <p:spPr>
+              <a:xfrm>
+                <a:off x="3807131" y="3232736"/>
+                <a:ext cx="505844" cy="369332"/>
+              </a:xfrm>
+              <a:prstGeom prst="rect">
+                <a:avLst/>
+              </a:prstGeom>
+              <a:blipFill>
+                <a:blip r:embed="rId6"/>
+                <a:stretch>
+                  <a:fillRect/>
+                </a:stretch>
+              </a:blipFill>
+            </p:spPr>
+            <p:txBody>
+              <a:bodyPr/>
+              <a:lstStyle/>
+              <a:p>
+                <a:r>
+                  <a:rPr lang="en-US">
+                    <a:noFill/>
+                  </a:rPr>
+                  <a:t> </a:t>
+                </a:r>
+              </a:p>
+            </p:txBody>
+          </p:sp>
+        </mc:Fallback>
+      </mc:AlternateContent>
+      <p:sp>
+        <p:nvSpPr>
+          <p:cNvPr id="19" name="원호 18"/>
+          <p:cNvSpPr/>
+          <p:nvPr/>
+        </p:nvSpPr>
+        <p:spPr>
+          <a:xfrm rot="5400000">
+            <a:off x="1234822" y="1666875"/>
+            <a:ext cx="2514600" cy="2514600"/>
+          </a:xfrm>
+          <a:prstGeom prst="arc">
+            <a:avLst>
+              <a:gd name="adj1" fmla="val 13743802"/>
+              <a:gd name="adj2" fmla="val 18743846"/>
+            </a:avLst>
+          </a:prstGeom>
+          <a:ln w="19050">
+            <a:solidFill>
+              <a:schemeClr val="tx1"/>
+            </a:solidFill>
+            <a:prstDash val="sysDot"/>
+          </a:ln>
+        </p:spPr>
+        <p:style>
+          <a:lnRef idx="1">
+            <a:schemeClr val="accent1"/>
+          </a:lnRef>
+          <a:fillRef idx="0">
+            <a:schemeClr val="accent1"/>
+          </a:fillRef>
+          <a:effectRef idx="0">
+            <a:schemeClr val="accent1"/>
+          </a:effectRef>
+          <a:fontRef idx="minor">
+            <a:schemeClr val="tx1"/>
+          </a:fontRef>
+        </p:style>
+        <p:txBody>
+          <a:bodyPr rtlCol="0" anchor="ctr"/>
+          <a:lstStyle/>
+          <a:p>
+            <a:pPr algn="ctr"/>
+            <a:endParaRPr lang="ko-KR" altLang="en-US"/>
+          </a:p>
+        </p:txBody>
+      </p:sp>
+      <mc:AlternateContent xmlns:mc="http://schemas.openxmlformats.org/markup-compatibility/2006">
+        <mc:Choice xmlns:a14="http://schemas.microsoft.com/office/drawing/2010/main" Requires="a14">
+          <p:sp>
+            <p:nvSpPr>
+              <p:cNvPr id="20" name="TextBox 19"/>
+              <p:cNvSpPr txBox="1"/>
+              <p:nvPr/>
+            </p:nvSpPr>
+            <p:spPr>
+              <a:xfrm>
+                <a:off x="3497205" y="2394536"/>
+                <a:ext cx="509242" cy="369332"/>
+              </a:xfrm>
+              <a:prstGeom prst="rect">
+                <a:avLst/>
+              </a:prstGeom>
+              <a:solidFill>
+                <a:schemeClr val="bg1"/>
+              </a:solidFill>
+            </p:spPr>
+            <p:txBody>
+              <a:bodyPr wrap="none" rtlCol="0">
+                <a:spAutoFit/>
+              </a:bodyPr>
+              <a:lstStyle/>
+              <a:p>
+                <a:pPr/>
+                <a14:m>
+                  <m:oMathPara xmlns:m="http://schemas.openxmlformats.org/officeDocument/2006/math">
+                    <m:oMathParaPr>
+                      <m:jc m:val="centerGroup"/>
+                    </m:oMathParaPr>
+                    <m:oMath xmlns:m="http://schemas.openxmlformats.org/officeDocument/2006/math">
+                      <m:r>
+                        <m:rPr>
+                          <m:sty m:val="p"/>
+                        </m:rPr>
+                        <a:rPr lang="en-US" altLang="ko-KR" b="0" i="0" smtClean="0">
+                          <a:latin typeface="Cambria Math" panose="02040503050406030204" pitchFamily="18" charset="0"/>
+                        </a:rPr>
+                        <m:t>Δ</m:t>
+                      </m:r>
+                      <m:r>
+                        <a:rPr lang="en-US" altLang="ko-KR" b="0" i="1" smtClean="0">
+                          <a:latin typeface="Cambria Math" panose="02040503050406030204" pitchFamily="18" charset="0"/>
+                        </a:rPr>
+                        <m:t>𝑦</m:t>
+                      </m:r>
+                    </m:oMath>
+                  </m:oMathPara>
+                </a14:m>
+                <a:endParaRPr lang="ko-KR" altLang="en-US" dirty="0"/>
+              </a:p>
+            </p:txBody>
+          </p:sp>
+        </mc:Choice>
+        <mc:Fallback>
+          <p:sp>
+            <p:nvSpPr>
+              <p:cNvPr id="20" name="TextBox 19"/>
+              <p:cNvSpPr txBox="1">
+                <a:spLocks noRot="1" noChangeAspect="1" noMove="1" noResize="1" noEditPoints="1" noAdjustHandles="1" noChangeArrowheads="1" noChangeShapeType="1" noTextEdit="1"/>
+              </p:cNvSpPr>
+              <p:nvPr/>
+            </p:nvSpPr>
+            <p:spPr>
+              <a:xfrm>
+                <a:off x="3497205" y="2394536"/>
+                <a:ext cx="509242" cy="369332"/>
+              </a:xfrm>
+              <a:prstGeom prst="rect">
+                <a:avLst/>
+              </a:prstGeom>
+              <a:blipFill>
+                <a:blip r:embed="rId7"/>
+                <a:stretch>
+                  <a:fillRect b="-6667"/>
+                </a:stretch>
+              </a:blipFill>
+            </p:spPr>
+            <p:txBody>
+              <a:bodyPr/>
+              <a:lstStyle/>
+              <a:p>
+                <a:r>
+                  <a:rPr lang="en-US">
+                    <a:noFill/>
+                  </a:rPr>
+                  <a:t> </a:t>
+                </a:r>
+              </a:p>
+            </p:txBody>
+          </p:sp>
+        </mc:Fallback>
+      </mc:AlternateContent>
+      <p:cxnSp>
+        <p:nvCxnSpPr>
+          <p:cNvPr id="22" name="직선 화살표 연결선 21"/>
+          <p:cNvCxnSpPr/>
+          <p:nvPr/>
+        </p:nvCxnSpPr>
+        <p:spPr>
+          <a:xfrm flipV="1">
+            <a:off x="4305244" y="962025"/>
+            <a:ext cx="0" cy="1130518"/>
+          </a:xfrm>
+          <a:prstGeom prst="straightConnector1">
+            <a:avLst/>
+          </a:prstGeom>
+          <a:ln w="57150">
+            <a:solidFill>
+              <a:schemeClr val="tx1"/>
+            </a:solidFill>
+            <a:tailEnd type="triangle"/>
+          </a:ln>
+        </p:spPr>
+        <p:style>
+          <a:lnRef idx="1">
+            <a:schemeClr val="accent1"/>
+          </a:lnRef>
+          <a:fillRef idx="0">
+            <a:schemeClr val="accent1"/>
+          </a:fillRef>
+          <a:effectRef idx="0">
+            <a:schemeClr val="accent1"/>
+          </a:effectRef>
+          <a:fontRef idx="minor">
+            <a:schemeClr val="tx1"/>
+          </a:fontRef>
+        </p:style>
+      </p:cxnSp>
+      <mc:AlternateContent xmlns:mc="http://schemas.openxmlformats.org/markup-compatibility/2006">
+        <mc:Choice xmlns:a14="http://schemas.microsoft.com/office/drawing/2010/main" Requires="a14">
+          <p:sp>
+            <p:nvSpPr>
+              <p:cNvPr id="24" name="TextBox 23"/>
+              <p:cNvSpPr txBox="1"/>
+              <p:nvPr/>
+            </p:nvSpPr>
+            <p:spPr>
+              <a:xfrm>
+                <a:off x="2949672" y="3706651"/>
+                <a:ext cx="780727" cy="369332"/>
+              </a:xfrm>
+              <a:prstGeom prst="rect">
+                <a:avLst/>
+              </a:prstGeom>
+              <a:noFill/>
+            </p:spPr>
+            <p:txBody>
+              <a:bodyPr wrap="none" rtlCol="0">
+                <a:spAutoFit/>
+              </a:bodyPr>
+              <a:lstStyle/>
+              <a:p>
+                <a:pPr/>
+                <a14:m>
+                  <m:oMathPara xmlns:m="http://schemas.openxmlformats.org/officeDocument/2006/math">
+                    <m:oMathParaPr>
+                      <m:jc m:val="centerGroup"/>
+                    </m:oMathParaPr>
+                    <m:oMath xmlns:m="http://schemas.openxmlformats.org/officeDocument/2006/math">
+                      <m:r>
+                        <a:rPr lang="en-US" altLang="ko-KR" b="0" i="1" smtClean="0">
+                          <a:latin typeface="Cambria Math" panose="02040503050406030204" pitchFamily="18" charset="0"/>
+                        </a:rPr>
+                        <m:t>(</m:t>
+                      </m:r>
+                      <m:r>
+                        <a:rPr lang="en-US" altLang="ko-KR" b="0" i="1" smtClean="0">
+                          <a:latin typeface="Cambria Math" panose="02040503050406030204" pitchFamily="18" charset="0"/>
+                        </a:rPr>
+                        <m:t>𝑥</m:t>
+                      </m:r>
+                      <m:r>
+                        <a:rPr lang="en-US" altLang="ko-KR" b="0" i="1" smtClean="0">
+                          <a:latin typeface="Cambria Math" panose="02040503050406030204" pitchFamily="18" charset="0"/>
+                        </a:rPr>
+                        <m:t>,</m:t>
+                      </m:r>
+                      <m:r>
+                        <a:rPr lang="en-US" altLang="ko-KR" b="0" i="1" smtClean="0">
+                          <a:latin typeface="Cambria Math" panose="02040503050406030204" pitchFamily="18" charset="0"/>
+                        </a:rPr>
+                        <m:t>𝑦</m:t>
+                      </m:r>
+                      <m:r>
+                        <a:rPr lang="en-US" altLang="ko-KR" b="0" i="1" smtClean="0">
+                          <a:latin typeface="Cambria Math" panose="02040503050406030204" pitchFamily="18" charset="0"/>
+                        </a:rPr>
+                        <m:t>)</m:t>
+                      </m:r>
+                    </m:oMath>
+                  </m:oMathPara>
+                </a14:m>
+                <a:endParaRPr lang="ko-KR" altLang="en-US" dirty="0"/>
+              </a:p>
+            </p:txBody>
+          </p:sp>
+        </mc:Choice>
+        <mc:Fallback>
+          <p:sp>
+            <p:nvSpPr>
+              <p:cNvPr id="24" name="TextBox 23"/>
+              <p:cNvSpPr txBox="1">
+                <a:spLocks noRot="1" noChangeAspect="1" noMove="1" noResize="1" noEditPoints="1" noAdjustHandles="1" noChangeArrowheads="1" noChangeShapeType="1" noTextEdit="1"/>
+              </p:cNvSpPr>
+              <p:nvPr/>
+            </p:nvSpPr>
+            <p:spPr>
+              <a:xfrm>
+                <a:off x="2949672" y="3706651"/>
+                <a:ext cx="780727" cy="369332"/>
+              </a:xfrm>
+              <a:prstGeom prst="rect">
+                <a:avLst/>
+              </a:prstGeom>
+              <a:blipFill>
+                <a:blip r:embed="rId8"/>
+                <a:stretch>
+                  <a:fillRect b="-13115"/>
+                </a:stretch>
+              </a:blipFill>
+            </p:spPr>
+            <p:txBody>
+              <a:bodyPr/>
+              <a:lstStyle/>
+              <a:p>
+                <a:r>
+                  <a:rPr lang="en-US">
+                    <a:noFill/>
+                  </a:rPr>
+                  <a:t> </a:t>
+                </a:r>
+              </a:p>
+            </p:txBody>
+          </p:sp>
+        </mc:Fallback>
+      </mc:AlternateContent>
+      <p:sp>
+        <p:nvSpPr>
+          <p:cNvPr id="3" name="TextBox 2">
+            <a:extLst>
+              <a:ext uri="{FF2B5EF4-FFF2-40B4-BE49-F238E27FC236}">
+                <a16:creationId xmlns:a16="http://schemas.microsoft.com/office/drawing/2014/main" id="{0EB93694-8335-8DAF-2045-836ABF1ECFDC}"/>
+              </a:ext>
+            </a:extLst>
+          </p:cNvPr>
+          <p:cNvSpPr txBox="1"/>
+          <p:nvPr/>
+        </p:nvSpPr>
+        <p:spPr>
+          <a:xfrm>
+            <a:off x="3804314" y="2586814"/>
+            <a:ext cx="1324346" cy="646331"/>
+          </a:xfrm>
+          <a:prstGeom prst="rect">
+            <a:avLst/>
+          </a:prstGeom>
+          <a:noFill/>
+        </p:spPr>
+        <p:txBody>
+          <a:bodyPr wrap="square">
+            <a:spAutoFit/>
+          </a:bodyPr>
+          <a:lstStyle/>
+          <a:p>
+            <a:pPr algn="ctr"/>
+            <a:r>
+              <a:rPr lang="en-US" altLang="ko-KR" dirty="0">
+                <a:solidFill>
+                  <a:sysClr val="windowText" lastClr="000000"/>
+                </a:solidFill>
+              </a:rPr>
+              <a:t>infinitesimal</a:t>
+            </a:r>
+          </a:p>
+          <a:p>
+            <a:pPr algn="ctr"/>
+            <a:r>
+              <a:rPr lang="en-US" altLang="ko-KR" dirty="0">
+                <a:solidFill>
+                  <a:sysClr val="windowText" lastClr="000000"/>
+                </a:solidFill>
+              </a:rPr>
+              <a:t>region</a:t>
+            </a:r>
+            <a:endParaRPr lang="ko-KR" altLang="en-US" dirty="0">
+              <a:solidFill>
+                <a:sysClr val="windowText" lastClr="000000"/>
+              </a:solidFill>
+            </a:endParaRPr>
+          </a:p>
+        </p:txBody>
+      </p:sp>
+    </p:spTree>
+    <p:extLst>
+      <p:ext uri="{BB962C8B-B14F-4D97-AF65-F5344CB8AC3E}">
+        <p14:creationId xmlns:p14="http://schemas.microsoft.com/office/powerpoint/2010/main" val="19773116"/>
       </p:ext>
     </p:extLst>
   </p:cSld>

</xml_diff>